<commit_message>
Updated to ch3 end. 	modified:   week02-ch2-3-pys.pptx
</commit_message>
<xml_diff>
--- a/week02-ch2-3-pys.pptx
+++ b/week02-ch2-3-pys.pptx
@@ -3464,7 +3464,22 @@
                 <a:latin typeface="Times New Roman" panose="02020603050405020304" pitchFamily="18" charset="0"/>
                 <a:cs typeface="Times New Roman" panose="02020603050405020304" pitchFamily="18" charset="0"/>
               </a:rPr>
-              <a:t>Print </a:t>
+              <a:t>Print (“I’m a lumberjack, and I’m okay.”)</a:t>
+            </a:r>
+          </a:p>
+          <a:p>
+            <a:pPr marL="457200" lvl="1" indent="0">
+              <a:buNone/>
+            </a:pPr>
+            <a:r>
+              <a:rPr lang="en-US" sz="1600" dirty="0">
+                <a:solidFill>
+                  <a:srgbClr val="FF0000"/>
+                </a:solidFill>
+                <a:latin typeface="Times New Roman" panose="02020603050405020304" pitchFamily="18" charset="0"/>
+                <a:cs typeface="Times New Roman" panose="02020603050405020304" pitchFamily="18" charset="0"/>
+              </a:rPr>
+              <a:t> </a:t>
             </a:r>
             <a:r>
               <a:rPr lang="en-US" sz="1600" dirty="0" smtClean="0">
@@ -3474,97 +3489,8 @@
                 <a:latin typeface="Times New Roman" panose="02020603050405020304" pitchFamily="18" charset="0"/>
                 <a:cs typeface="Times New Roman" panose="02020603050405020304" pitchFamily="18" charset="0"/>
               </a:rPr>
-              <a:t>(“</a:t>
-            </a:r>
-            <a:r>
-              <a:rPr lang="en-US" sz="1600" dirty="0" smtClean="0">
-                <a:solidFill>
-                  <a:srgbClr val="FF0000"/>
-                </a:solidFill>
-                <a:latin typeface="Times New Roman" panose="02020603050405020304" pitchFamily="18" charset="0"/>
-                <a:cs typeface="Times New Roman" panose="02020603050405020304" pitchFamily="18" charset="0"/>
-              </a:rPr>
-              <a:t>I’m a lumberjack, and I’m okay</a:t>
-            </a:r>
-            <a:r>
-              <a:rPr lang="en-US" sz="1600" dirty="0" smtClean="0">
-                <a:solidFill>
-                  <a:srgbClr val="FF0000"/>
-                </a:solidFill>
-                <a:latin typeface="Times New Roman" panose="02020603050405020304" pitchFamily="18" charset="0"/>
-                <a:cs typeface="Times New Roman" panose="02020603050405020304" pitchFamily="18" charset="0"/>
-              </a:rPr>
-              <a:t>.”)</a:t>
-            </a:r>
-            <a:endParaRPr lang="en-US" sz="1600" dirty="0" smtClean="0">
-              <a:solidFill>
-                <a:srgbClr val="FF0000"/>
-              </a:solidFill>
-              <a:latin typeface="Times New Roman" panose="02020603050405020304" pitchFamily="18" charset="0"/>
-              <a:cs typeface="Times New Roman" panose="02020603050405020304" pitchFamily="18" charset="0"/>
-            </a:endParaRPr>
-          </a:p>
-          <a:p>
-            <a:pPr marL="457200" lvl="1" indent="0">
-              <a:buNone/>
-            </a:pPr>
-            <a:r>
-              <a:rPr lang="en-US" sz="1600" dirty="0">
-                <a:solidFill>
-                  <a:srgbClr val="FF0000"/>
-                </a:solidFill>
-                <a:latin typeface="Times New Roman" panose="02020603050405020304" pitchFamily="18" charset="0"/>
-                <a:cs typeface="Times New Roman" panose="02020603050405020304" pitchFamily="18" charset="0"/>
-              </a:rPr>
-              <a:t> </a:t>
-            </a:r>
-            <a:r>
-              <a:rPr lang="en-US" sz="1600" dirty="0" smtClean="0">
-                <a:solidFill>
-                  <a:srgbClr val="FF0000"/>
-                </a:solidFill>
-                <a:latin typeface="Times New Roman" panose="02020603050405020304" pitchFamily="18" charset="0"/>
-                <a:cs typeface="Times New Roman" panose="02020603050405020304" pitchFamily="18" charset="0"/>
-              </a:rPr>
-              <a:t>   Print </a:t>
-            </a:r>
-            <a:r>
-              <a:rPr lang="en-US" sz="1600" dirty="0" smtClean="0">
-                <a:solidFill>
-                  <a:srgbClr val="FF0000"/>
-                </a:solidFill>
-                <a:latin typeface="Times New Roman" panose="02020603050405020304" pitchFamily="18" charset="0"/>
-                <a:cs typeface="Times New Roman" panose="02020603050405020304" pitchFamily="18" charset="0"/>
-              </a:rPr>
-              <a:t>(“</a:t>
-            </a:r>
-            <a:r>
-              <a:rPr lang="en-US" sz="1600" dirty="0" smtClean="0">
-                <a:solidFill>
-                  <a:srgbClr val="FF0000"/>
-                </a:solidFill>
-                <a:latin typeface="Times New Roman" panose="02020603050405020304" pitchFamily="18" charset="0"/>
-                <a:cs typeface="Times New Roman" panose="02020603050405020304" pitchFamily="18" charset="0"/>
-              </a:rPr>
-              <a:t>I sleep all night and I work all day</a:t>
-            </a:r>
-            <a:r>
-              <a:rPr lang="en-US" sz="1600" dirty="0" smtClean="0">
-                <a:solidFill>
-                  <a:srgbClr val="FF0000"/>
-                </a:solidFill>
-                <a:latin typeface="Times New Roman" panose="02020603050405020304" pitchFamily="18" charset="0"/>
-                <a:cs typeface="Times New Roman" panose="02020603050405020304" pitchFamily="18" charset="0"/>
-              </a:rPr>
-              <a:t>.”)</a:t>
-            </a:r>
-            <a:endParaRPr lang="en-US" sz="1600" dirty="0" smtClean="0">
-              <a:solidFill>
-                <a:srgbClr val="FF0000"/>
-              </a:solidFill>
-              <a:latin typeface="Times New Roman" panose="02020603050405020304" pitchFamily="18" charset="0"/>
-              <a:cs typeface="Times New Roman" panose="02020603050405020304" pitchFamily="18" charset="0"/>
-            </a:endParaRPr>
+              <a:t>   Print (“I sleep all night and I work all day.”)</a:t>
+            </a:r>
           </a:p>
           <a:p>
             <a:r>
@@ -3928,13 +3854,8 @@
             <a:pPr lvl="3"/>
             <a:r>
               <a:rPr lang="en-US" dirty="0" smtClean="0"/>
-              <a:t>Jumps to the body of the </a:t>
-            </a:r>
-            <a:r>
-              <a:rPr lang="en-US" dirty="0" smtClean="0"/>
-              <a:t>function </a:t>
-            </a:r>
-            <a:endParaRPr lang="en-US" dirty="0" smtClean="0"/>
+              <a:t>Jumps to the body of the function </a:t>
+            </a:r>
           </a:p>
           <a:p>
             <a:pPr lvl="3"/>
@@ -4576,6 +4497,104 @@
             <a:pPr marL="0" indent="0">
               <a:buNone/>
             </a:pPr>
+            <a:r>
+              <a:rPr lang="en-US" sz="800" i="1" dirty="0" smtClean="0">
+                <a:latin typeface="Times New Roman" panose="02020603050405020304" pitchFamily="18" charset="0"/>
+                <a:cs typeface="Times New Roman" panose="02020603050405020304" pitchFamily="18" charset="0"/>
+              </a:rPr>
+              <a:t>*strings </a:t>
+            </a:r>
+            <a:r>
+              <a:rPr lang="en-US" sz="800" i="1" dirty="0" err="1" smtClean="0">
+                <a:latin typeface="Times New Roman" panose="02020603050405020304" pitchFamily="18" charset="0"/>
+                <a:cs typeface="Times New Roman" panose="02020603050405020304" pitchFamily="18" charset="0"/>
+              </a:rPr>
+              <a:t>bruce</a:t>
+            </a:r>
+            <a:r>
+              <a:rPr lang="en-US" sz="800" i="1" dirty="0" smtClean="0">
+                <a:latin typeface="Times New Roman" panose="02020603050405020304" pitchFamily="18" charset="0"/>
+                <a:cs typeface="Times New Roman" panose="02020603050405020304" pitchFamily="18" charset="0"/>
+              </a:rPr>
+              <a:t>, part1, part2 must already be defined</a:t>
+            </a:r>
+            <a:endParaRPr lang="en-US" sz="800" i="1" dirty="0">
+              <a:latin typeface="Times New Roman" panose="02020603050405020304" pitchFamily="18" charset="0"/>
+              <a:cs typeface="Times New Roman" panose="02020603050405020304" pitchFamily="18" charset="0"/>
+            </a:endParaRPr>
+          </a:p>
+          <a:p>
+            <a:pPr marL="0" indent="0">
+              <a:buNone/>
+            </a:pPr>
+            <a:r>
+              <a:rPr lang="en-US" sz="1200" dirty="0" err="1" smtClean="0">
+                <a:latin typeface="Times New Roman" panose="02020603050405020304" pitchFamily="18" charset="0"/>
+                <a:cs typeface="Times New Roman" panose="02020603050405020304" pitchFamily="18" charset="0"/>
+              </a:rPr>
+              <a:t>def</a:t>
+            </a:r>
+            <a:r>
+              <a:rPr lang="en-US" sz="1200" dirty="0" smtClean="0">
+                <a:latin typeface="Times New Roman" panose="02020603050405020304" pitchFamily="18" charset="0"/>
+                <a:cs typeface="Times New Roman" panose="02020603050405020304" pitchFamily="18" charset="0"/>
+              </a:rPr>
+              <a:t> </a:t>
+            </a:r>
+            <a:r>
+              <a:rPr lang="en-US" sz="1200" dirty="0" err="1">
+                <a:latin typeface="Times New Roman" panose="02020603050405020304" pitchFamily="18" charset="0"/>
+                <a:cs typeface="Times New Roman" panose="02020603050405020304" pitchFamily="18" charset="0"/>
+              </a:rPr>
+              <a:t>print_twice</a:t>
+            </a:r>
+            <a:r>
+              <a:rPr lang="en-US" sz="1200" dirty="0">
+                <a:latin typeface="Times New Roman" panose="02020603050405020304" pitchFamily="18" charset="0"/>
+                <a:cs typeface="Times New Roman" panose="02020603050405020304" pitchFamily="18" charset="0"/>
+              </a:rPr>
+              <a:t>(</a:t>
+            </a:r>
+            <a:r>
+              <a:rPr lang="en-US" sz="1200" dirty="0" err="1">
+                <a:latin typeface="Times New Roman" panose="02020603050405020304" pitchFamily="18" charset="0"/>
+                <a:cs typeface="Times New Roman" panose="02020603050405020304" pitchFamily="18" charset="0"/>
+              </a:rPr>
+              <a:t>bruce</a:t>
+            </a:r>
+            <a:r>
+              <a:rPr lang="en-US" sz="1200" dirty="0">
+                <a:latin typeface="Times New Roman" panose="02020603050405020304" pitchFamily="18" charset="0"/>
+                <a:cs typeface="Times New Roman" panose="02020603050405020304" pitchFamily="18" charset="0"/>
+              </a:rPr>
+              <a:t>):</a:t>
+            </a:r>
+          </a:p>
+          <a:p>
+            <a:pPr marL="0" indent="0">
+              <a:buNone/>
+            </a:pPr>
+            <a:r>
+              <a:rPr lang="en-US" sz="1200" dirty="0" smtClean="0">
+                <a:latin typeface="Times New Roman" panose="02020603050405020304" pitchFamily="18" charset="0"/>
+                <a:cs typeface="Times New Roman" panose="02020603050405020304" pitchFamily="18" charset="0"/>
+              </a:rPr>
+              <a:t>    print (</a:t>
+            </a:r>
+            <a:r>
+              <a:rPr lang="en-US" sz="1200" dirty="0" err="1" smtClean="0">
+                <a:latin typeface="Times New Roman" panose="02020603050405020304" pitchFamily="18" charset="0"/>
+                <a:cs typeface="Times New Roman" panose="02020603050405020304" pitchFamily="18" charset="0"/>
+              </a:rPr>
+              <a:t>bruce</a:t>
+            </a:r>
+            <a:r>
+              <a:rPr lang="en-US" sz="1200" dirty="0" smtClean="0">
+                <a:latin typeface="Times New Roman" panose="02020603050405020304" pitchFamily="18" charset="0"/>
+                <a:cs typeface="Times New Roman" panose="02020603050405020304" pitchFamily="18" charset="0"/>
+              </a:rPr>
+              <a:t>)</a:t>
+            </a:r>
             <a:endParaRPr lang="en-US" sz="1200" dirty="0">
               <a:latin typeface="Times New Roman" panose="02020603050405020304" pitchFamily="18" charset="0"/>
               <a:cs typeface="Times New Roman" panose="02020603050405020304" pitchFamily="18" charset="0"/>
@@ -4586,10 +4605,40 @@
               <a:buNone/>
             </a:pPr>
             <a:r>
+              <a:rPr lang="en-US" sz="1200" dirty="0" smtClean="0">
+                <a:latin typeface="Times New Roman" panose="02020603050405020304" pitchFamily="18" charset="0"/>
+                <a:cs typeface="Times New Roman" panose="02020603050405020304" pitchFamily="18" charset="0"/>
+              </a:rPr>
+              <a:t>    print (</a:t>
+            </a:r>
+            <a:r>
               <a:rPr lang="en-US" sz="1200" dirty="0" err="1" smtClean="0">
                 <a:latin typeface="Times New Roman" panose="02020603050405020304" pitchFamily="18" charset="0"/>
                 <a:cs typeface="Times New Roman" panose="02020603050405020304" pitchFamily="18" charset="0"/>
               </a:rPr>
+              <a:t>bruce</a:t>
+            </a:r>
+            <a:r>
+              <a:rPr lang="en-US" sz="1200" dirty="0" smtClean="0">
+                <a:latin typeface="Times New Roman" panose="02020603050405020304" pitchFamily="18" charset="0"/>
+                <a:cs typeface="Times New Roman" panose="02020603050405020304" pitchFamily="18" charset="0"/>
+              </a:rPr>
+              <a:t>)</a:t>
+            </a:r>
+            <a:endParaRPr lang="en-US" sz="1200" dirty="0" smtClean="0">
+              <a:latin typeface="Times New Roman" panose="02020603050405020304" pitchFamily="18" charset="0"/>
+              <a:cs typeface="Times New Roman" panose="02020603050405020304" pitchFamily="18" charset="0"/>
+            </a:endParaRPr>
+          </a:p>
+          <a:p>
+            <a:pPr marL="0" indent="0">
+              <a:buNone/>
+            </a:pPr>
+            <a:r>
+              <a:rPr lang="en-US" sz="1200" dirty="0" err="1" smtClean="0">
+                <a:latin typeface="Times New Roman" panose="02020603050405020304" pitchFamily="18" charset="0"/>
+                <a:cs typeface="Times New Roman" panose="02020603050405020304" pitchFamily="18" charset="0"/>
+              </a:rPr>
               <a:t>def</a:t>
             </a:r>
             <a:r>
@@ -4600,44 +4649,77 @@
               <a:t> </a:t>
             </a:r>
             <a:r>
-              <a:rPr lang="en-US" sz="1200" dirty="0" err="1">
+              <a:rPr lang="en-US" sz="1200" dirty="0" err="1" smtClean="0">
+                <a:latin typeface="Times New Roman" panose="02020603050405020304" pitchFamily="18" charset="0"/>
+                <a:cs typeface="Times New Roman" panose="02020603050405020304" pitchFamily="18" charset="0"/>
+              </a:rPr>
+              <a:t>cat_twice</a:t>
+            </a:r>
+            <a:r>
+              <a:rPr lang="en-US" sz="1200" dirty="0" smtClean="0">
+                <a:latin typeface="Times New Roman" panose="02020603050405020304" pitchFamily="18" charset="0"/>
+                <a:cs typeface="Times New Roman" panose="02020603050405020304" pitchFamily="18" charset="0"/>
+              </a:rPr>
+              <a:t>(part1, part2):</a:t>
+            </a:r>
+          </a:p>
+          <a:p>
+            <a:pPr marL="0" indent="0">
+              <a:buNone/>
+            </a:pPr>
+            <a:r>
+              <a:rPr lang="en-US" sz="1200" dirty="0" smtClean="0">
+                <a:latin typeface="Times New Roman" panose="02020603050405020304" pitchFamily="18" charset="0"/>
+                <a:cs typeface="Times New Roman" panose="02020603050405020304" pitchFamily="18" charset="0"/>
+              </a:rPr>
+              <a:t>    cat = part1 + part2</a:t>
+            </a:r>
+          </a:p>
+          <a:p>
+            <a:pPr marL="0" indent="0">
+              <a:buNone/>
+            </a:pPr>
+            <a:r>
+              <a:rPr lang="en-US" sz="1200" dirty="0">
+                <a:latin typeface="Times New Roman" panose="02020603050405020304" pitchFamily="18" charset="0"/>
+                <a:cs typeface="Times New Roman" panose="02020603050405020304" pitchFamily="18" charset="0"/>
+              </a:rPr>
+              <a:t> </a:t>
+            </a:r>
+            <a:r>
+              <a:rPr lang="en-US" sz="1200" dirty="0" smtClean="0">
+                <a:latin typeface="Times New Roman" panose="02020603050405020304" pitchFamily="18" charset="0"/>
+                <a:cs typeface="Times New Roman" panose="02020603050405020304" pitchFamily="18" charset="0"/>
+              </a:rPr>
+              <a:t>   return </a:t>
+            </a:r>
+            <a:r>
+              <a:rPr lang="en-US" sz="1200" dirty="0" smtClean="0">
+                <a:latin typeface="Times New Roman" panose="02020603050405020304" pitchFamily="18" charset="0"/>
+                <a:cs typeface="Times New Roman" panose="02020603050405020304" pitchFamily="18" charset="0"/>
+              </a:rPr>
+              <a:t>cat</a:t>
+            </a:r>
+          </a:p>
+          <a:p>
+            <a:pPr marL="0" indent="0">
+              <a:buNone/>
+            </a:pPr>
+            <a:endParaRPr lang="en-US" sz="1200" dirty="0" smtClean="0">
+              <a:latin typeface="Times New Roman" panose="02020603050405020304" pitchFamily="18" charset="0"/>
+              <a:cs typeface="Times New Roman" panose="02020603050405020304" pitchFamily="18" charset="0"/>
+            </a:endParaRPr>
+          </a:p>
+          <a:p>
+            <a:pPr marL="0" indent="0">
+              <a:buNone/>
+            </a:pPr>
+            <a:r>
+              <a:rPr lang="en-US" sz="1200" dirty="0" err="1" smtClean="0">
                 <a:latin typeface="Times New Roman" panose="02020603050405020304" pitchFamily="18" charset="0"/>
                 <a:cs typeface="Times New Roman" panose="02020603050405020304" pitchFamily="18" charset="0"/>
               </a:rPr>
               <a:t>print_twice</a:t>
-            </a:r>
-            <a:r>
-              <a:rPr lang="en-US" sz="1200" dirty="0">
-                <a:latin typeface="Times New Roman" panose="02020603050405020304" pitchFamily="18" charset="0"/>
-                <a:cs typeface="Times New Roman" panose="02020603050405020304" pitchFamily="18" charset="0"/>
-              </a:rPr>
-              <a:t>(</a:t>
-            </a:r>
-            <a:r>
-              <a:rPr lang="en-US" sz="1200" dirty="0" err="1">
-                <a:latin typeface="Times New Roman" panose="02020603050405020304" pitchFamily="18" charset="0"/>
-                <a:cs typeface="Times New Roman" panose="02020603050405020304" pitchFamily="18" charset="0"/>
-              </a:rPr>
-              <a:t>bruce</a:t>
-            </a:r>
-            <a:r>
-              <a:rPr lang="en-US" sz="1200" dirty="0">
-                <a:latin typeface="Times New Roman" panose="02020603050405020304" pitchFamily="18" charset="0"/>
-                <a:cs typeface="Times New Roman" panose="02020603050405020304" pitchFamily="18" charset="0"/>
-              </a:rPr>
-              <a:t>):</a:t>
-            </a:r>
-          </a:p>
-          <a:p>
-            <a:pPr marL="0" indent="0">
-              <a:buNone/>
-            </a:pPr>
-            <a:r>
-              <a:rPr lang="en-US" sz="1200" dirty="0" smtClean="0">
-                <a:latin typeface="Times New Roman" panose="02020603050405020304" pitchFamily="18" charset="0"/>
-                <a:cs typeface="Times New Roman" panose="02020603050405020304" pitchFamily="18" charset="0"/>
-              </a:rPr>
-              <a:t>    print </a:t>
             </a:r>
             <a:r>
               <a:rPr lang="en-US" sz="1200" dirty="0" smtClean="0">
@@ -4674,151 +4756,28 @@
                 <a:latin typeface="Times New Roman" panose="02020603050405020304" pitchFamily="18" charset="0"/>
                 <a:cs typeface="Times New Roman" panose="02020603050405020304" pitchFamily="18" charset="0"/>
               </a:rPr>
-              <a:t>    print </a:t>
+              <a:t>print(</a:t>
+            </a:r>
+            <a:r>
+              <a:rPr lang="en-US" sz="1200" dirty="0" err="1" smtClean="0">
+                <a:latin typeface="Times New Roman" panose="02020603050405020304" pitchFamily="18" charset="0"/>
+                <a:cs typeface="Times New Roman" panose="02020603050405020304" pitchFamily="18" charset="0"/>
+              </a:rPr>
+              <a:t>cat_twice</a:t>
             </a:r>
             <a:r>
               <a:rPr lang="en-US" sz="1200" dirty="0" smtClean="0">
                 <a:latin typeface="Times New Roman" panose="02020603050405020304" pitchFamily="18" charset="0"/>
                 <a:cs typeface="Times New Roman" panose="02020603050405020304" pitchFamily="18" charset="0"/>
               </a:rPr>
-              <a:t>(</a:t>
-            </a:r>
-            <a:r>
-              <a:rPr lang="en-US" sz="1200" dirty="0" err="1" smtClean="0">
-                <a:latin typeface="Times New Roman" panose="02020603050405020304" pitchFamily="18" charset="0"/>
-                <a:cs typeface="Times New Roman" panose="02020603050405020304" pitchFamily="18" charset="0"/>
-              </a:rPr>
-              <a:t>bruce</a:t>
+              <a:t>(cat</a:t>
             </a:r>
             <a:r>
               <a:rPr lang="en-US" sz="1200" dirty="0" smtClean="0">
                 <a:latin typeface="Times New Roman" panose="02020603050405020304" pitchFamily="18" charset="0"/>
                 <a:cs typeface="Times New Roman" panose="02020603050405020304" pitchFamily="18" charset="0"/>
               </a:rPr>
-              <a:t>)</a:t>
-            </a:r>
-            <a:endParaRPr lang="en-US" sz="1200" dirty="0" smtClean="0">
-              <a:latin typeface="Times New Roman" panose="02020603050405020304" pitchFamily="18" charset="0"/>
-              <a:cs typeface="Times New Roman" panose="02020603050405020304" pitchFamily="18" charset="0"/>
-            </a:endParaRPr>
-          </a:p>
-          <a:p>
-            <a:pPr marL="0" indent="0">
-              <a:buNone/>
-            </a:pPr>
-            <a:endParaRPr lang="en-US" sz="1200" dirty="0" smtClean="0">
-              <a:latin typeface="Times New Roman" panose="02020603050405020304" pitchFamily="18" charset="0"/>
-              <a:cs typeface="Times New Roman" panose="02020603050405020304" pitchFamily="18" charset="0"/>
-            </a:endParaRPr>
-          </a:p>
-          <a:p>
-            <a:pPr marL="0" indent="0">
-              <a:buNone/>
-            </a:pPr>
-            <a:r>
-              <a:rPr lang="en-US" sz="1200" dirty="0" err="1" smtClean="0">
-                <a:latin typeface="Times New Roman" panose="02020603050405020304" pitchFamily="18" charset="0"/>
-                <a:cs typeface="Times New Roman" panose="02020603050405020304" pitchFamily="18" charset="0"/>
-              </a:rPr>
-              <a:t>def</a:t>
-            </a:r>
-            <a:r>
-              <a:rPr lang="en-US" sz="1200" dirty="0" smtClean="0">
-                <a:latin typeface="Times New Roman" panose="02020603050405020304" pitchFamily="18" charset="0"/>
-                <a:cs typeface="Times New Roman" panose="02020603050405020304" pitchFamily="18" charset="0"/>
-              </a:rPr>
-              <a:t> </a:t>
-            </a:r>
-            <a:r>
-              <a:rPr lang="en-US" sz="1200" dirty="0" err="1" smtClean="0">
-                <a:latin typeface="Times New Roman" panose="02020603050405020304" pitchFamily="18" charset="0"/>
-                <a:cs typeface="Times New Roman" panose="02020603050405020304" pitchFamily="18" charset="0"/>
-              </a:rPr>
-              <a:t>cat_twice</a:t>
-            </a:r>
-            <a:r>
-              <a:rPr lang="en-US" sz="1200" dirty="0" smtClean="0">
-                <a:latin typeface="Times New Roman" panose="02020603050405020304" pitchFamily="18" charset="0"/>
-                <a:cs typeface="Times New Roman" panose="02020603050405020304" pitchFamily="18" charset="0"/>
-              </a:rPr>
-              <a:t>(part1, part2):</a:t>
-            </a:r>
-          </a:p>
-          <a:p>
-            <a:pPr marL="0" indent="0">
-              <a:buNone/>
-            </a:pPr>
-            <a:r>
-              <a:rPr lang="en-US" sz="1200" dirty="0" smtClean="0">
-                <a:latin typeface="Times New Roman" panose="02020603050405020304" pitchFamily="18" charset="0"/>
-                <a:cs typeface="Times New Roman" panose="02020603050405020304" pitchFamily="18" charset="0"/>
-              </a:rPr>
-              <a:t>    cat = part1 + </a:t>
-            </a:r>
-            <a:r>
-              <a:rPr lang="en-US" sz="1200" dirty="0" smtClean="0">
-                <a:latin typeface="Times New Roman" panose="02020603050405020304" pitchFamily="18" charset="0"/>
-                <a:cs typeface="Times New Roman" panose="02020603050405020304" pitchFamily="18" charset="0"/>
-              </a:rPr>
-              <a:t>part2</a:t>
-            </a:r>
-          </a:p>
-          <a:p>
-            <a:pPr marL="0" indent="0">
-              <a:buNone/>
-            </a:pPr>
-            <a:r>
-              <a:rPr lang="en-US" sz="1200" dirty="0">
-                <a:latin typeface="Times New Roman" panose="02020603050405020304" pitchFamily="18" charset="0"/>
-                <a:cs typeface="Times New Roman" panose="02020603050405020304" pitchFamily="18" charset="0"/>
-              </a:rPr>
-              <a:t> </a:t>
-            </a:r>
-            <a:r>
-              <a:rPr lang="en-US" sz="1200" dirty="0" smtClean="0">
-                <a:latin typeface="Times New Roman" panose="02020603050405020304" pitchFamily="18" charset="0"/>
-                <a:cs typeface="Times New Roman" panose="02020603050405020304" pitchFamily="18" charset="0"/>
-              </a:rPr>
-              <a:t>   return cat</a:t>
-            </a:r>
-            <a:endParaRPr lang="en-US" sz="1200" dirty="0" smtClean="0">
-              <a:latin typeface="Times New Roman" panose="02020603050405020304" pitchFamily="18" charset="0"/>
-              <a:cs typeface="Times New Roman" panose="02020603050405020304" pitchFamily="18" charset="0"/>
-            </a:endParaRPr>
-          </a:p>
-          <a:p>
-            <a:pPr marL="0" indent="0">
-              <a:buNone/>
-            </a:pPr>
-            <a:endParaRPr lang="en-US" sz="1200" dirty="0">
-              <a:latin typeface="Times New Roman" panose="02020603050405020304" pitchFamily="18" charset="0"/>
-              <a:cs typeface="Times New Roman" panose="02020603050405020304" pitchFamily="18" charset="0"/>
-            </a:endParaRPr>
-          </a:p>
-          <a:p>
-            <a:pPr marL="0" indent="0">
-              <a:buNone/>
-            </a:pPr>
-            <a:r>
-              <a:rPr lang="en-US" sz="1200" dirty="0" smtClean="0">
-                <a:latin typeface="Times New Roman" panose="02020603050405020304" pitchFamily="18" charset="0"/>
-                <a:cs typeface="Times New Roman" panose="02020603050405020304" pitchFamily="18" charset="0"/>
-              </a:rPr>
-              <a:t>print(</a:t>
-            </a:r>
-            <a:r>
-              <a:rPr lang="en-US" sz="1200" dirty="0" err="1" smtClean="0">
-                <a:latin typeface="Times New Roman" panose="02020603050405020304" pitchFamily="18" charset="0"/>
-                <a:cs typeface="Times New Roman" panose="02020603050405020304" pitchFamily="18" charset="0"/>
-              </a:rPr>
-              <a:t>cat_twice</a:t>
-            </a:r>
-            <a:r>
-              <a:rPr lang="en-US" sz="1200" dirty="0" smtClean="0">
-                <a:latin typeface="Times New Roman" panose="02020603050405020304" pitchFamily="18" charset="0"/>
-                <a:cs typeface="Times New Roman" panose="02020603050405020304" pitchFamily="18" charset="0"/>
-              </a:rPr>
-              <a:t>(cat))</a:t>
+              <a:t>))</a:t>
             </a:r>
             <a:endParaRPr lang="en-US" sz="1200" dirty="0" smtClean="0">
               <a:latin typeface="Times New Roman" panose="02020603050405020304" pitchFamily="18" charset="0"/>
@@ -5491,15 +5450,7 @@
             </a:r>
             <a:r>
               <a:rPr lang="en-US" dirty="0" smtClean="0"/>
-              <a:t> </a:t>
-            </a:r>
-            <a:r>
-              <a:rPr lang="en-US" dirty="0" smtClean="0"/>
-              <a:t>python3.6 </a:t>
-            </a:r>
-            <a:r>
-              <a:rPr lang="en-US" dirty="0" smtClean="0"/>
-              <a:t>- can be used to call a script with the local environment</a:t>
+              <a:t> python3.6 - can be used to call a script with the local environment</a:t>
             </a:r>
           </a:p>
           <a:p>
@@ -5514,19 +5465,7 @@
             </a:r>
             <a:r>
               <a:rPr lang="en-US" dirty="0" smtClean="0"/>
-              <a:t>/local/bin/python3.6 </a:t>
-            </a:r>
-            <a:r>
-              <a:rPr lang="en-US" dirty="0" smtClean="0"/>
-              <a:t>– requires </a:t>
-            </a:r>
-            <a:r>
-              <a:rPr lang="en-US" dirty="0" smtClean="0"/>
-              <a:t>python3.6 </a:t>
-            </a:r>
-            <a:r>
-              <a:rPr lang="en-US" dirty="0" smtClean="0"/>
-              <a:t>installed in /</a:t>
+              <a:t>/local/bin/python3.6 – requires python3.6 installed in /</a:t>
             </a:r>
             <a:r>
               <a:rPr lang="en-US" dirty="0" err="1" smtClean="0"/>
@@ -5822,10 +5761,6 @@
               </a:rPr>
               <a:t>'&gt;</a:t>
             </a:r>
-            <a:endParaRPr lang="en-US" sz="1800" dirty="0">
-              <a:latin typeface="Times New Roman" panose="02020603050405020304" pitchFamily="18" charset="0"/>
-              <a:cs typeface="Times New Roman" panose="02020603050405020304" pitchFamily="18" charset="0"/>
-            </a:endParaRPr>
           </a:p>
         </p:txBody>
       </p:sp>
@@ -5950,21 +5885,7 @@
                 <a:latin typeface="Times New Roman" panose="02020603050405020304" pitchFamily="18" charset="0"/>
                 <a:cs typeface="Times New Roman" panose="02020603050405020304" pitchFamily="18" charset="0"/>
               </a:rPr>
-              <a:t>&gt;&gt;&gt; </a:t>
-            </a:r>
-            <a:r>
-              <a:rPr lang="en-US" dirty="0" smtClean="0">
-                <a:latin typeface="Times New Roman" panose="02020603050405020304" pitchFamily="18" charset="0"/>
-                <a:cs typeface="Times New Roman" panose="02020603050405020304" pitchFamily="18" charset="0"/>
-              </a:rPr>
-              <a:t>type(a</a:t>
-            </a:r>
-            <a:r>
-              <a:rPr lang="en-US" dirty="0" smtClean="0">
-                <a:latin typeface="Times New Roman" panose="02020603050405020304" pitchFamily="18" charset="0"/>
-                <a:cs typeface="Times New Roman" panose="02020603050405020304" pitchFamily="18" charset="0"/>
-              </a:rPr>
-              <a:t>)</a:t>
+              <a:t>&gt;&gt;&gt; type(a)</a:t>
             </a:r>
           </a:p>
           <a:p>
@@ -6281,19 +6202,8 @@
                 <a:latin typeface="Times New Roman" panose="02020603050405020304" pitchFamily="18" charset="0"/>
                 <a:cs typeface="Times New Roman" panose="02020603050405020304" pitchFamily="18" charset="0"/>
               </a:rPr>
-              <a:t>&gt;&gt;&gt; </a:t>
-            </a:r>
-            <a:r>
-              <a:rPr lang="en-US" dirty="0" smtClean="0">
-                <a:latin typeface="Times New Roman" panose="02020603050405020304" pitchFamily="18" charset="0"/>
-                <a:cs typeface="Times New Roman" panose="02020603050405020304" pitchFamily="18" charset="0"/>
-              </a:rPr>
-              <a:t>print(b)</a:t>
-            </a:r>
-            <a:endParaRPr lang="en-US" dirty="0" smtClean="0">
-              <a:latin typeface="Times New Roman" panose="02020603050405020304" pitchFamily="18" charset="0"/>
-              <a:cs typeface="Times New Roman" panose="02020603050405020304" pitchFamily="18" charset="0"/>
-            </a:endParaRPr>
+              <a:t>&gt;&gt;&gt; print(b)</a:t>
+            </a:r>
           </a:p>
           <a:p>
             <a:pPr marL="0" indent="0">

</xml_diff>